<commit_message>
better example for rho...
</commit_message>
<xml_diff>
--- a/classes/stats2018/Lecture18.pptx
+++ b/classes/stats2018/Lecture18.pptx
@@ -10894,14 +10894,14 @@
           </a:ln>
           <a:extLst>
             <a:ext uri="{909E8E84-426E-40dd-AFC4-6F175D3DCCD1}">
-              <a14:hiddenFill xmlns:a14="http://schemas.microsoft.com/office/drawing/2010/main" xmlns="">
+              <a14:hiddenFill xmlns="" xmlns:a14="http://schemas.microsoft.com/office/drawing/2010/main">
                 <a:solidFill>
                   <a:srgbClr val="FFFFFF"/>
                 </a:solidFill>
               </a14:hiddenFill>
             </a:ext>
             <a:ext uri="{91240B29-F687-4f45-9708-019B960494DF}">
-              <a14:hiddenLine xmlns:a14="http://schemas.microsoft.com/office/drawing/2010/main" xmlns="" w="9525">
+              <a14:hiddenLine xmlns="" xmlns:a14="http://schemas.microsoft.com/office/drawing/2010/main" w="9525">
                 <a:solidFill>
                   <a:srgbClr val="000000"/>
                 </a:solidFill>
@@ -11091,14 +11091,14 @@
           </a:ln>
           <a:extLst>
             <a:ext uri="{909E8E84-426E-40dd-AFC4-6F175D3DCCD1}">
-              <a14:hiddenFill xmlns:a14="http://schemas.microsoft.com/office/drawing/2010/main" xmlns="">
+              <a14:hiddenFill xmlns="" xmlns:a14="http://schemas.microsoft.com/office/drawing/2010/main">
                 <a:solidFill>
                   <a:srgbClr val="FFFFFF"/>
                 </a:solidFill>
               </a14:hiddenFill>
             </a:ext>
             <a:ext uri="{91240B29-F687-4f45-9708-019B960494DF}">
-              <a14:hiddenLine xmlns:a14="http://schemas.microsoft.com/office/drawing/2010/main" xmlns="" w="9525">
+              <a14:hiddenLine xmlns="" xmlns:a14="http://schemas.microsoft.com/office/drawing/2010/main" w="9525">
                 <a:solidFill>
                   <a:srgbClr val="000000"/>
                 </a:solidFill>
@@ -11304,14 +11304,14 @@
           </a:ln>
           <a:extLst>
             <a:ext uri="{909E8E84-426E-40dd-AFC4-6F175D3DCCD1}">
-              <a14:hiddenFill xmlns:a14="http://schemas.microsoft.com/office/drawing/2010/main" xmlns="">
+              <a14:hiddenFill xmlns="" xmlns:a14="http://schemas.microsoft.com/office/drawing/2010/main">
                 <a:solidFill>
                   <a:srgbClr val="FFFFFF"/>
                 </a:solidFill>
               </a14:hiddenFill>
             </a:ext>
             <a:ext uri="{91240B29-F687-4f45-9708-019B960494DF}">
-              <a14:hiddenLine xmlns:a14="http://schemas.microsoft.com/office/drawing/2010/main" xmlns="" w="9525">
+              <a14:hiddenLine xmlns="" xmlns:a14="http://schemas.microsoft.com/office/drawing/2010/main" w="9525">
                 <a:solidFill>
                   <a:srgbClr val="000000"/>
                 </a:solidFill>
@@ -13076,6 +13076,36 @@
           </a:p>
         </p:txBody>
       </p:sp>
+      <p:pic>
+        <p:nvPicPr>
+          <p:cNvPr id="2" name="Picture 1">
+            <a:extLst>
+              <a:ext uri="{FF2B5EF4-FFF2-40B4-BE49-F238E27FC236}">
+                <a16:creationId xmlns:a16="http://schemas.microsoft.com/office/drawing/2014/main" id="{EBB32621-067D-40F7-A354-78FB73A7FC90}"/>
+              </a:ext>
+            </a:extLst>
+          </p:cNvPr>
+          <p:cNvPicPr>
+            <a:picLocks noChangeAspect="1"/>
+          </p:cNvPicPr>
+          <p:nvPr/>
+        </p:nvPicPr>
+        <p:blipFill>
+          <a:blip r:embed="rId4"/>
+          <a:stretch>
+            <a:fillRect/>
+          </a:stretch>
+        </p:blipFill>
+        <p:spPr>
+          <a:xfrm>
+            <a:off x="5029200" y="4934112"/>
+            <a:ext cx="3831652" cy="647375"/>
+          </a:xfrm>
+          <a:prstGeom prst="rect">
+            <a:avLst/>
+          </a:prstGeom>
+        </p:spPr>
+      </p:pic>
     </p:spTree>
     <p:extLst>
       <p:ext uri="{BB962C8B-B14F-4D97-AF65-F5344CB8AC3E}">

</xml_diff>